<commit_message>
Updating scripts and plots for revision
</commit_message>
<xml_diff>
--- a/other_figures/TIMBR_DAG.pptx
+++ b/other_figures/TIMBR_DAG.pptx
@@ -208,7 +208,7 @@
           <a:p>
             <a:fld id="{DB84D83F-3FED-4936-B8CA-0408AD567277}" type="datetimeFigureOut">
               <a:rPr lang="en-US" smtClean="0"/>
-              <a:t>9/24/2020</a:t>
+              <a:t>9/29/2020</a:t>
             </a:fld>
             <a:endParaRPr lang="en-US"/>
           </a:p>
@@ -739,7 +739,7 @@
             <a:fld id="{7D5C41E0-3A46-0E43-AD43-905AF9976B6B}" type="datetimeFigureOut">
               <a:rPr lang="en-US" smtClean="0"/>
               <a:pPr/>
-              <a:t>9/24/2020</a:t>
+              <a:t>9/29/2020</a:t>
             </a:fld>
             <a:endParaRPr lang="en-US"/>
           </a:p>
@@ -909,7 +909,7 @@
             <a:fld id="{7D5C41E0-3A46-0E43-AD43-905AF9976B6B}" type="datetimeFigureOut">
               <a:rPr lang="en-US" smtClean="0"/>
               <a:pPr/>
-              <a:t>9/24/2020</a:t>
+              <a:t>9/29/2020</a:t>
             </a:fld>
             <a:endParaRPr lang="en-US"/>
           </a:p>
@@ -1089,7 +1089,7 @@
             <a:fld id="{7D5C41E0-3A46-0E43-AD43-905AF9976B6B}" type="datetimeFigureOut">
               <a:rPr lang="en-US" smtClean="0"/>
               <a:pPr/>
-              <a:t>9/24/2020</a:t>
+              <a:t>9/29/2020</a:t>
             </a:fld>
             <a:endParaRPr lang="en-US"/>
           </a:p>
@@ -1259,7 +1259,7 @@
             <a:fld id="{7D5C41E0-3A46-0E43-AD43-905AF9976B6B}" type="datetimeFigureOut">
               <a:rPr lang="en-US" smtClean="0"/>
               <a:pPr/>
-              <a:t>9/24/2020</a:t>
+              <a:t>9/29/2020</a:t>
             </a:fld>
             <a:endParaRPr lang="en-US"/>
           </a:p>
@@ -1506,7 +1506,7 @@
             <a:fld id="{7D5C41E0-3A46-0E43-AD43-905AF9976B6B}" type="datetimeFigureOut">
               <a:rPr lang="en-US" smtClean="0"/>
               <a:pPr/>
-              <a:t>9/24/2020</a:t>
+              <a:t>9/29/2020</a:t>
             </a:fld>
             <a:endParaRPr lang="en-US"/>
           </a:p>
@@ -1793,7 +1793,7 @@
             <a:fld id="{7D5C41E0-3A46-0E43-AD43-905AF9976B6B}" type="datetimeFigureOut">
               <a:rPr lang="en-US" smtClean="0"/>
               <a:pPr/>
-              <a:t>9/24/2020</a:t>
+              <a:t>9/29/2020</a:t>
             </a:fld>
             <a:endParaRPr lang="en-US"/>
           </a:p>
@@ -2219,7 +2219,7 @@
             <a:fld id="{7D5C41E0-3A46-0E43-AD43-905AF9976B6B}" type="datetimeFigureOut">
               <a:rPr lang="en-US" smtClean="0"/>
               <a:pPr/>
-              <a:t>9/24/2020</a:t>
+              <a:t>9/29/2020</a:t>
             </a:fld>
             <a:endParaRPr lang="en-US"/>
           </a:p>
@@ -2338,7 +2338,7 @@
             <a:fld id="{7D5C41E0-3A46-0E43-AD43-905AF9976B6B}" type="datetimeFigureOut">
               <a:rPr lang="en-US" smtClean="0"/>
               <a:pPr/>
-              <a:t>9/24/2020</a:t>
+              <a:t>9/29/2020</a:t>
             </a:fld>
             <a:endParaRPr lang="en-US"/>
           </a:p>
@@ -2435,7 +2435,7 @@
             <a:fld id="{7D5C41E0-3A46-0E43-AD43-905AF9976B6B}" type="datetimeFigureOut">
               <a:rPr lang="en-US" smtClean="0"/>
               <a:pPr/>
-              <a:t>9/24/2020</a:t>
+              <a:t>9/29/2020</a:t>
             </a:fld>
             <a:endParaRPr lang="en-US"/>
           </a:p>
@@ -2712,7 +2712,7 @@
             <a:fld id="{7D5C41E0-3A46-0E43-AD43-905AF9976B6B}" type="datetimeFigureOut">
               <a:rPr lang="en-US" smtClean="0"/>
               <a:pPr/>
-              <a:t>9/24/2020</a:t>
+              <a:t>9/29/2020</a:t>
             </a:fld>
             <a:endParaRPr lang="en-US"/>
           </a:p>
@@ -2966,7 +2966,7 @@
             <a:fld id="{7D5C41E0-3A46-0E43-AD43-905AF9976B6B}" type="datetimeFigureOut">
               <a:rPr lang="en-US" smtClean="0"/>
               <a:pPr/>
-              <a:t>9/24/2020</a:t>
+              <a:t>9/29/2020</a:t>
             </a:fld>
             <a:endParaRPr lang="en-US"/>
           </a:p>
@@ -3179,7 +3179,7 @@
             <a:fld id="{7D5C41E0-3A46-0E43-AD43-905AF9976B6B}" type="datetimeFigureOut">
               <a:rPr lang="en-US" smtClean="0"/>
               <a:pPr/>
-              <a:t>9/24/2020</a:t>
+              <a:t>9/29/2020</a:t>
             </a:fld>
             <a:endParaRPr lang="en-US"/>
           </a:p>
@@ -7466,8 +7466,8 @@
         </p:nvSpPr>
         <p:spPr>
           <a:xfrm>
-            <a:off x="8492766" y="1937872"/>
-            <a:ext cx="492669" cy="276999"/>
+            <a:off x="8492766" y="1944596"/>
+            <a:ext cx="492669" cy="261610"/>
           </a:xfrm>
           <a:prstGeom prst="rect">
             <a:avLst/>
@@ -7482,7 +7482,10 @@
           <a:p>
             <a:pPr algn="ctr"/>
             <a:r>
-              <a:rPr lang="en-US" sz="1200" b="1" dirty="0"/>
+              <a:rPr lang="en-US" sz="1050" b="1" dirty="0">
+                <a:latin typeface="Arial" panose="020B0604020202020204" pitchFamily="34" charset="0"/>
+                <a:cs typeface="Arial" panose="020B0604020202020204" pitchFamily="34" charset="0"/>
+              </a:rPr>
               <a:t>Trait</a:t>
             </a:r>
           </a:p>
@@ -7502,8 +7505,8 @@
         </p:nvSpPr>
         <p:spPr>
           <a:xfrm>
-            <a:off x="1624364" y="1069781"/>
-            <a:ext cx="1030884" cy="276999"/>
+            <a:off x="1649237" y="922562"/>
+            <a:ext cx="950422" cy="415498"/>
           </a:xfrm>
           <a:prstGeom prst="rect">
             <a:avLst/>
@@ -7518,7 +7521,10 @@
           <a:p>
             <a:pPr algn="ctr"/>
             <a:r>
-              <a:rPr lang="en-US" sz="1200" b="1" dirty="0"/>
+              <a:rPr lang="en-US" sz="1050" b="1" dirty="0">
+                <a:latin typeface="Arial" panose="020B0604020202020204" pitchFamily="34" charset="0"/>
+                <a:cs typeface="Arial" panose="020B0604020202020204" pitchFamily="34" charset="0"/>
+              </a:rPr>
               <a:t>Allele Effects</a:t>
             </a:r>
           </a:p>
@@ -7538,8 +7544,8 @@
         </p:nvSpPr>
         <p:spPr>
           <a:xfrm>
-            <a:off x="1703132" y="2128088"/>
-            <a:ext cx="873348" cy="461665"/>
+            <a:off x="1703132" y="2134812"/>
+            <a:ext cx="873348" cy="430887"/>
           </a:xfrm>
           <a:prstGeom prst="rect">
             <a:avLst/>
@@ -7554,7 +7560,10 @@
           <a:p>
             <a:pPr algn="ctr"/>
             <a:r>
-              <a:rPr lang="en-US" sz="1200" b="1" dirty="0"/>
+              <a:rPr lang="en-US" sz="1050" b="1" dirty="0">
+                <a:latin typeface="Arial" panose="020B0604020202020204" pitchFamily="34" charset="0"/>
+                <a:cs typeface="Arial" panose="020B0604020202020204" pitchFamily="34" charset="0"/>
+              </a:rPr>
               <a:t>Diplotype States</a:t>
             </a:r>
           </a:p>
@@ -7574,8 +7583,8 @@
         </p:nvSpPr>
         <p:spPr>
           <a:xfrm>
-            <a:off x="1631001" y="3543309"/>
-            <a:ext cx="1004910" cy="276999"/>
+            <a:off x="1637351" y="3367330"/>
+            <a:ext cx="1004910" cy="430887"/>
           </a:xfrm>
           <a:prstGeom prst="rect">
             <a:avLst/>
@@ -7590,7 +7599,10 @@
           <a:p>
             <a:pPr algn="ctr"/>
             <a:r>
-              <a:rPr lang="en-US" sz="1200" b="1" dirty="0"/>
+              <a:rPr lang="en-US" sz="1050" b="1" dirty="0">
+                <a:latin typeface="Arial" panose="020B0604020202020204" pitchFamily="34" charset="0"/>
+                <a:cs typeface="Arial" panose="020B0604020202020204" pitchFamily="34" charset="0"/>
+              </a:rPr>
               <a:t>Allelic Series</a:t>
             </a:r>
           </a:p>
@@ -7610,8 +7622,8 @@
         </p:nvSpPr>
         <p:spPr>
           <a:xfrm>
-            <a:off x="234810" y="3527011"/>
-            <a:ext cx="470921" cy="276999"/>
+            <a:off x="234810" y="3540459"/>
+            <a:ext cx="470921" cy="253916"/>
           </a:xfrm>
           <a:prstGeom prst="rect">
             <a:avLst/>
@@ -7626,7 +7638,10 @@
           <a:p>
             <a:pPr algn="ctr"/>
             <a:r>
-              <a:rPr lang="en-US" sz="1200" b="1" dirty="0"/>
+              <a:rPr lang="en-US" sz="1050" b="1" dirty="0">
+                <a:latin typeface="Arial" panose="020B0604020202020204" pitchFamily="34" charset="0"/>
+                <a:cs typeface="Arial" panose="020B0604020202020204" pitchFamily="34" charset="0"/>
+              </a:rPr>
               <a:t>Tree</a:t>
             </a:r>
           </a:p>
@@ -7647,7 +7662,7 @@
         <p:spPr>
           <a:xfrm>
             <a:off x="1687757" y="5912047"/>
-            <a:ext cx="917908" cy="461665"/>
+            <a:ext cx="917908" cy="430887"/>
           </a:xfrm>
           <a:prstGeom prst="rect">
             <a:avLst/>
@@ -7662,7 +7677,10 @@
           <a:p>
             <a:pPr algn="ctr"/>
             <a:r>
-              <a:rPr lang="en-US" sz="1200" b="1" dirty="0"/>
+              <a:rPr lang="en-US" sz="1050" b="1" dirty="0">
+                <a:latin typeface="Arial" panose="020B0604020202020204" pitchFamily="34" charset="0"/>
+                <a:cs typeface="Arial" panose="020B0604020202020204" pitchFamily="34" charset="0"/>
+              </a:rPr>
               <a:t>Branch Mutations</a:t>
             </a:r>
           </a:p>
@@ -7683,7 +7701,7 @@
         <p:spPr>
           <a:xfrm>
             <a:off x="3205335" y="5908226"/>
-            <a:ext cx="1168546" cy="461665"/>
+            <a:ext cx="1168546" cy="430887"/>
           </a:xfrm>
           <a:prstGeom prst="rect">
             <a:avLst/>
@@ -7698,7 +7716,10 @@
           <a:p>
             <a:pPr algn="ctr"/>
             <a:r>
-              <a:rPr lang="en-US" sz="1200" b="1" dirty="0"/>
+              <a:rPr lang="en-US" sz="1050" b="1" dirty="0">
+                <a:latin typeface="Arial" panose="020B0604020202020204" pitchFamily="34" charset="0"/>
+                <a:cs typeface="Arial" panose="020B0604020202020204" pitchFamily="34" charset="0"/>
+              </a:rPr>
               <a:t>Concentration Parameter</a:t>
             </a:r>
           </a:p>
@@ -7718,8 +7739,8 @@
         </p:nvSpPr>
         <p:spPr>
           <a:xfrm>
-            <a:off x="-21946" y="2119442"/>
-            <a:ext cx="1004375" cy="461665"/>
+            <a:off x="-21946" y="2126166"/>
+            <a:ext cx="1004375" cy="415498"/>
           </a:xfrm>
           <a:prstGeom prst="rect">
             <a:avLst/>
@@ -7734,14 +7755,20 @@
           <a:p>
             <a:pPr algn="ctr"/>
             <a:r>
-              <a:rPr lang="en-US" sz="1200" b="1" dirty="0"/>
+              <a:rPr lang="en-US" sz="1050" b="1" dirty="0">
+                <a:latin typeface="Arial" panose="020B0604020202020204" pitchFamily="34" charset="0"/>
+                <a:cs typeface="Arial" panose="020B0604020202020204" pitchFamily="34" charset="0"/>
+              </a:rPr>
               <a:t>Diplotype</a:t>
             </a:r>
           </a:p>
           <a:p>
             <a:pPr algn="ctr"/>
             <a:r>
-              <a:rPr lang="en-US" sz="1200" b="1" dirty="0"/>
+              <a:rPr lang="en-US" sz="1050" b="1" dirty="0">
+                <a:latin typeface="Arial" panose="020B0604020202020204" pitchFamily="34" charset="0"/>
+                <a:cs typeface="Arial" panose="020B0604020202020204" pitchFamily="34" charset="0"/>
+              </a:rPr>
               <a:t>Probabilities</a:t>
             </a:r>
           </a:p>

</xml_diff>